<commit_message>
Added fletcher files to repo
</commit_message>
<xml_diff>
--- a/Week7/fletcher/presentation/BSturm_recipes_180529.pptx
+++ b/Week7/fletcher/presentation/BSturm_recipes_180529.pptx
@@ -216,7 +216,7 @@
           <a:p>
             <a:fld id="{5964BEA2-6E7C-FA42-83A0-9188FCAFF19A}" type="datetimeFigureOut">
               <a:rPr lang="en-US" smtClean="0"/>
-              <a:t>5/29/18</a:t>
+              <a:t>5/31/18</a:t>
             </a:fld>
             <a:endParaRPr lang="en-US"/>
           </a:p>
@@ -611,16 +611,7 @@
           <a:bodyPr/>
           <a:lstStyle/>
           <a:p>
-            <a:r>
-              <a:rPr lang="en-US" b="0" dirty="0"/>
-              <a:t>Need to think of a good image:</a:t>
-            </a:r>
-          </a:p>
-          <a:p>
-            <a:r>
-              <a:rPr lang="en-US" b="0" dirty="0"/>
-              <a:t>Perhaps have pictures of different foods and put them in a 2D plot</a:t>
-            </a:r>
+            <a:endParaRPr lang="en-US" b="0" dirty="0"/>
           </a:p>
         </p:txBody>
       </p:sp>
@@ -817,7 +808,7 @@
           <a:p>
             <a:fld id="{D922543D-A46D-DD47-9D46-45DA50D21A6B}" type="datetime1">
               <a:rPr lang="en-US" smtClean="0"/>
-              <a:t>5/29/18</a:t>
+              <a:t>5/31/18</a:t>
             </a:fld>
             <a:endParaRPr lang="en-US"/>
           </a:p>
@@ -1126,7 +1117,7 @@
           <a:p>
             <a:fld id="{5CD016ED-2560-714A-AA6C-1EA6E76C8542}" type="datetime1">
               <a:rPr lang="en-US" smtClean="0"/>
-              <a:t>5/29/18</a:t>
+              <a:t>5/31/18</a:t>
             </a:fld>
             <a:endParaRPr lang="en-US"/>
           </a:p>
@@ -1294,7 +1285,7 @@
           <a:p>
             <a:fld id="{DAFBF817-C259-5D47-93E3-3EDC5C8AFD4A}" type="datetime1">
               <a:rPr lang="en-US" smtClean="0"/>
-              <a:t>5/29/18</a:t>
+              <a:t>5/31/18</a:t>
             </a:fld>
             <a:endParaRPr lang="en-US"/>
           </a:p>
@@ -1472,7 +1463,7 @@
           <a:p>
             <a:fld id="{26297360-FC71-784F-AED3-8DB764DD4B01}" type="datetime1">
               <a:rPr lang="en-US" smtClean="0"/>
-              <a:t>5/29/18</a:t>
+              <a:t>5/31/18</a:t>
             </a:fld>
             <a:endParaRPr lang="en-US"/>
           </a:p>
@@ -1589,7 +1580,7 @@
           <a:p>
             <a:fld id="{C2677E2C-BCFF-ED45-91BB-2CA2ED812580}" type="datetime1">
               <a:rPr lang="en-US" smtClean="0"/>
-              <a:t>5/29/18</a:t>
+              <a:t>5/31/18</a:t>
             </a:fld>
             <a:endParaRPr lang="en-US"/>
           </a:p>
@@ -1837,7 +1828,7 @@
           <a:p>
             <a:fld id="{76AF19F1-6395-224F-A74F-DED8D4681DD7}" type="datetime1">
               <a:rPr lang="en-US" smtClean="0"/>
-              <a:t>5/29/18</a:t>
+              <a:t>5/31/18</a:t>
             </a:fld>
             <a:endParaRPr lang="en-US"/>
           </a:p>
@@ -2005,7 +1996,7 @@
           <a:p>
             <a:fld id="{1C03EC1C-F490-5A4E-9ACC-2492016D21D5}" type="datetime1">
               <a:rPr lang="en-US" smtClean="0"/>
-              <a:t>5/29/18</a:t>
+              <a:t>5/31/18</a:t>
             </a:fld>
             <a:endParaRPr lang="en-US"/>
           </a:p>
@@ -2250,7 +2241,7 @@
           <a:p>
             <a:fld id="{7E47C55F-B596-5841-8EC2-630748E46444}" type="datetime1">
               <a:rPr lang="en-US" smtClean="0"/>
-              <a:t>5/29/18</a:t>
+              <a:t>5/31/18</a:t>
             </a:fld>
             <a:endParaRPr lang="en-US"/>
           </a:p>
@@ -2535,7 +2526,7 @@
           <a:p>
             <a:fld id="{3D6D6404-F176-864B-AB44-25459A91DA1D}" type="datetime1">
               <a:rPr lang="en-US" smtClean="0"/>
-              <a:t>5/29/18</a:t>
+              <a:t>5/31/18</a:t>
             </a:fld>
             <a:endParaRPr lang="en-US"/>
           </a:p>
@@ -2954,7 +2945,7 @@
           <a:p>
             <a:fld id="{7AE6F9C4-D3D5-BC47-9DD7-1130CC93EF78}" type="datetime1">
               <a:rPr lang="en-US" smtClean="0"/>
-              <a:t>5/29/18</a:t>
+              <a:t>5/31/18</a:t>
             </a:fld>
             <a:endParaRPr lang="en-US"/>
           </a:p>
@@ -3071,7 +3062,7 @@
           <a:p>
             <a:fld id="{A678C1BC-D821-9A47-BF1A-AE2F0601C781}" type="datetime1">
               <a:rPr lang="en-US" smtClean="0"/>
-              <a:t>5/29/18</a:t>
+              <a:t>5/31/18</a:t>
             </a:fld>
             <a:endParaRPr lang="en-US"/>
           </a:p>
@@ -3188,7 +3179,7 @@
           <a:p>
             <a:fld id="{1E7B3DB4-562B-474A-9AAC-142670ECE7D9}" type="datetime1">
               <a:rPr lang="en-US" smtClean="0"/>
-              <a:t>5/29/18</a:t>
+              <a:t>5/31/18</a:t>
             </a:fld>
             <a:endParaRPr lang="en-US"/>
           </a:p>
@@ -3283,7 +3274,7 @@
           <a:p>
             <a:fld id="{4B55A92E-4FEA-7049-8F29-FE6C8CFEAB43}" type="datetime1">
               <a:rPr lang="en-US" smtClean="0"/>
-              <a:t>5/29/18</a:t>
+              <a:t>5/31/18</a:t>
             </a:fld>
             <a:endParaRPr lang="en-US"/>
           </a:p>
@@ -3558,7 +3549,7 @@
           <a:p>
             <a:fld id="{CE3DA13E-B04D-1B40-BC0F-B78D883B7995}" type="datetime1">
               <a:rPr lang="en-US" smtClean="0"/>
-              <a:t>5/29/18</a:t>
+              <a:t>5/31/18</a:t>
             </a:fld>
             <a:endParaRPr lang="en-US"/>
           </a:p>
@@ -3813,7 +3804,7 @@
           <a:p>
             <a:fld id="{451B2646-E8BC-EA4E-98C3-283879196D0A}" type="datetime1">
               <a:rPr lang="en-US" smtClean="0"/>
-              <a:t>5/29/18</a:t>
+              <a:t>5/31/18</a:t>
             </a:fld>
             <a:endParaRPr lang="en-US"/>
           </a:p>
@@ -3981,7 +3972,7 @@
           <a:p>
             <a:fld id="{3EBD63BF-D055-1D4E-ABC7-634052912548}" type="datetime1">
               <a:rPr lang="en-US" smtClean="0"/>
-              <a:t>5/29/18</a:t>
+              <a:t>5/31/18</a:t>
             </a:fld>
             <a:endParaRPr lang="en-US"/>
           </a:p>
@@ -4159,7 +4150,7 @@
           <a:p>
             <a:fld id="{5737F5E3-B25E-8445-AC50-63EC3F7959F5}" type="datetime1">
               <a:rPr lang="en-US" smtClean="0"/>
-              <a:t>5/29/18</a:t>
+              <a:t>5/31/18</a:t>
             </a:fld>
             <a:endParaRPr lang="en-US"/>
           </a:p>
@@ -4327,7 +4318,7 @@
           <a:p>
             <a:fld id="{1DF6B9D4-57E5-6C40-9AC6-1D9CD98EEEA1}" type="datetime1">
               <a:rPr lang="en-US" smtClean="0"/>
-              <a:t>5/29/18</a:t>
+              <a:t>5/31/18</a:t>
             </a:fld>
             <a:endParaRPr lang="en-US"/>
           </a:p>
@@ -4572,7 +4563,7 @@
           <a:p>
             <a:fld id="{FD0AC78A-1242-C842-A103-2C8B9D6CC632}" type="datetime1">
               <a:rPr lang="en-US" smtClean="0"/>
-              <a:t>5/29/18</a:t>
+              <a:t>5/31/18</a:t>
             </a:fld>
             <a:endParaRPr lang="en-US"/>
           </a:p>
@@ -4964,7 +4955,7 @@
           <a:p>
             <a:fld id="{862206A4-BF9C-3641-B1F8-3292997807EA}" type="datetime1">
               <a:rPr lang="en-US" smtClean="0"/>
-              <a:t>5/29/18</a:t>
+              <a:t>5/31/18</a:t>
             </a:fld>
             <a:endParaRPr lang="en-US"/>
           </a:p>
@@ -5383,7 +5374,7 @@
           <a:p>
             <a:fld id="{9FECA9C5-759D-3440-A9D6-6010A4F2B522}" type="datetime1">
               <a:rPr lang="en-US" smtClean="0"/>
-              <a:t>5/29/18</a:t>
+              <a:t>5/31/18</a:t>
             </a:fld>
             <a:endParaRPr lang="en-US"/>
           </a:p>
@@ -5501,7 +5492,7 @@
           <a:p>
             <a:fld id="{4451C8AC-A08E-7A48-B47B-9253D726845C}" type="datetime1">
               <a:rPr lang="en-US" smtClean="0"/>
-              <a:t>5/29/18</a:t>
+              <a:t>5/31/18</a:t>
             </a:fld>
             <a:endParaRPr lang="en-US"/>
           </a:p>
@@ -5596,7 +5587,7 @@
           <a:p>
             <a:fld id="{ADE3BEB6-C767-D740-B936-15271875789E}" type="datetime1">
               <a:rPr lang="en-US" smtClean="0"/>
-              <a:t>5/29/18</a:t>
+              <a:t>5/31/18</a:t>
             </a:fld>
             <a:endParaRPr lang="en-US"/>
           </a:p>
@@ -5924,7 +5915,7 @@
           <a:p>
             <a:fld id="{BFDA9813-38BB-0049-BA28-46F65FE7F46A}" type="datetime1">
               <a:rPr lang="en-US" smtClean="0"/>
-              <a:t>5/29/18</a:t>
+              <a:t>5/31/18</a:t>
             </a:fld>
             <a:endParaRPr lang="en-US"/>
           </a:p>
@@ -6175,7 +6166,7 @@
           <a:p>
             <a:fld id="{B66F1BBF-F12A-8B40-AE96-7C241B692E6B}" type="datetime1">
               <a:rPr lang="en-US" smtClean="0"/>
-              <a:t>5/29/18</a:t>
+              <a:t>5/31/18</a:t>
             </a:fld>
             <a:endParaRPr lang="en-US"/>
           </a:p>
@@ -6764,7 +6755,7 @@
           <a:p>
             <a:fld id="{D6BDB4F5-0B26-C642-98A7-E357D85C5642}" type="datetime1">
               <a:rPr lang="en-US" smtClean="0"/>
-              <a:t>5/29/18</a:t>
+              <a:t>5/31/18</a:t>
             </a:fld>
             <a:endParaRPr lang="en-US"/>
           </a:p>
@@ -7274,6 +7265,17 @@
           </a:p>
           <a:p>
             <a:r>
+              <a:rPr lang="en-US">
+                <a:solidFill>
+                  <a:schemeClr val="tx1">
+                    <a:lumMod val="65000"/>
+                    <a:lumOff val="35000"/>
+                  </a:schemeClr>
+                </a:solidFill>
+              </a:rPr>
+              <a:t>June 1, </a:t>
+            </a:r>
+            <a:r>
               <a:rPr lang="en-US" dirty="0">
                 <a:solidFill>
                   <a:schemeClr val="tx1">
@@ -7282,7 +7284,7 @@
                   </a:schemeClr>
                 </a:solidFill>
               </a:rPr>
-              <a:t>May 16, 2018</a:t>
+              <a:t>2018</a:t>
             </a:r>
           </a:p>
         </p:txBody>
@@ -7453,71 +7455,13 @@
           <a:p>
             <a:r>
               <a:rPr lang="en-US" sz="2200" dirty="0"/>
-              <a:t>Which ingredients are most predictive of a particular cuisine?</a:t>
+              <a:t>Can we use topic modeling to separate out different cuisines?</a:t>
             </a:r>
           </a:p>
           <a:p>
             <a:r>
               <a:rPr lang="en-US" dirty="0"/>
               <a:t>	</a:t>
-            </a:r>
-          </a:p>
-        </p:txBody>
-      </p:sp>
-      <p:sp>
-        <p:nvSpPr>
-          <p:cNvPr id="18" name="Text Placeholder 17">
-            <a:extLst>
-              <a:ext uri="{FF2B5EF4-FFF2-40B4-BE49-F238E27FC236}">
-                <a16:creationId xmlns:a16="http://schemas.microsoft.com/office/drawing/2014/main" id="{B82535D0-E848-7644-9F31-FE4DCDF601A2}"/>
-              </a:ext>
-            </a:extLst>
-          </p:cNvPr>
-          <p:cNvSpPr>
-            <a:spLocks noGrp="1"/>
-          </p:cNvSpPr>
-          <p:nvPr>
-            <p:ph type="body" sz="quarter" idx="3"/>
-          </p:nvPr>
-        </p:nvSpPr>
-        <p:spPr>
-          <a:xfrm>
-            <a:off x="6193369" y="1329373"/>
-            <a:ext cx="5389033" cy="639762"/>
-          </a:xfrm>
-        </p:spPr>
-        <p:txBody>
-          <a:bodyPr/>
-          <a:lstStyle/>
-          <a:p>
-            <a:endParaRPr lang="en-US"/>
-          </a:p>
-        </p:txBody>
-      </p:sp>
-      <p:sp>
-        <p:nvSpPr>
-          <p:cNvPr id="19" name="Content Placeholder 18">
-            <a:extLst>
-              <a:ext uri="{FF2B5EF4-FFF2-40B4-BE49-F238E27FC236}">
-                <a16:creationId xmlns:a16="http://schemas.microsoft.com/office/drawing/2014/main" id="{ACE5B7C2-3DC2-884E-904C-34A83E16BF25}"/>
-              </a:ext>
-            </a:extLst>
-          </p:cNvPr>
-          <p:cNvSpPr>
-            <a:spLocks noGrp="1"/>
-          </p:cNvSpPr>
-          <p:nvPr>
-            <p:ph sz="quarter" idx="4"/>
-          </p:nvPr>
-        </p:nvSpPr>
-        <p:spPr/>
-        <p:txBody>
-          <a:bodyPr/>
-          <a:lstStyle/>
-          <a:p>
-            <a:r>
-              <a:rPr lang="en-US" dirty="0"/>
-              <a:t>Image to go here</a:t>
             </a:r>
           </a:p>
         </p:txBody>
@@ -7548,6 +7492,423 @@
               <a:t>2</a:t>
             </a:fld>
             <a:endParaRPr lang="en-US"/>
+          </a:p>
+        </p:txBody>
+      </p:sp>
+      <p:cxnSp>
+        <p:nvCxnSpPr>
+          <p:cNvPr id="6" name="Straight Arrow Connector 5">
+            <a:extLst>
+              <a:ext uri="{FF2B5EF4-FFF2-40B4-BE49-F238E27FC236}">
+                <a16:creationId xmlns:a16="http://schemas.microsoft.com/office/drawing/2014/main" id="{B8E8259E-FBB8-8345-BB1D-00F9563E402F}"/>
+              </a:ext>
+            </a:extLst>
+          </p:cNvPr>
+          <p:cNvCxnSpPr>
+            <a:cxnSpLocks/>
+          </p:cNvCxnSpPr>
+          <p:nvPr/>
+        </p:nvCxnSpPr>
+        <p:spPr>
+          <a:xfrm flipV="1">
+            <a:off x="6929180" y="1746504"/>
+            <a:ext cx="0" cy="4008838"/>
+          </a:xfrm>
+          <a:prstGeom prst="straightConnector1">
+            <a:avLst/>
+          </a:prstGeom>
+          <a:ln w="19050">
+            <a:tailEnd type="triangle"/>
+          </a:ln>
+        </p:spPr>
+        <p:style>
+          <a:lnRef idx="1">
+            <a:schemeClr val="accent1"/>
+          </a:lnRef>
+          <a:fillRef idx="0">
+            <a:schemeClr val="accent1"/>
+          </a:fillRef>
+          <a:effectRef idx="0">
+            <a:schemeClr val="accent1"/>
+          </a:effectRef>
+          <a:fontRef idx="minor">
+            <a:schemeClr val="tx1"/>
+          </a:fontRef>
+        </p:style>
+      </p:cxnSp>
+      <p:cxnSp>
+        <p:nvCxnSpPr>
+          <p:cNvPr id="9" name="Straight Arrow Connector 8">
+            <a:extLst>
+              <a:ext uri="{FF2B5EF4-FFF2-40B4-BE49-F238E27FC236}">
+                <a16:creationId xmlns:a16="http://schemas.microsoft.com/office/drawing/2014/main" id="{37E20497-DE02-C546-A001-BA7748BA6E26}"/>
+              </a:ext>
+            </a:extLst>
+          </p:cNvPr>
+          <p:cNvCxnSpPr>
+            <a:cxnSpLocks/>
+          </p:cNvCxnSpPr>
+          <p:nvPr/>
+        </p:nvCxnSpPr>
+        <p:spPr>
+          <a:xfrm>
+            <a:off x="6929180" y="5755341"/>
+            <a:ext cx="4653220" cy="0"/>
+          </a:xfrm>
+          <a:prstGeom prst="straightConnector1">
+            <a:avLst/>
+          </a:prstGeom>
+          <a:ln w="15875">
+            <a:tailEnd type="triangle"/>
+          </a:ln>
+        </p:spPr>
+        <p:style>
+          <a:lnRef idx="1">
+            <a:schemeClr val="accent1"/>
+          </a:lnRef>
+          <a:fillRef idx="0">
+            <a:schemeClr val="accent1"/>
+          </a:fillRef>
+          <a:effectRef idx="0">
+            <a:schemeClr val="accent1"/>
+          </a:effectRef>
+          <a:fontRef idx="minor">
+            <a:schemeClr val="tx1"/>
+          </a:fontRef>
+        </p:style>
+      </p:cxnSp>
+      <p:sp>
+        <p:nvSpPr>
+          <p:cNvPr id="14" name="TextBox 13">
+            <a:extLst>
+              <a:ext uri="{FF2B5EF4-FFF2-40B4-BE49-F238E27FC236}">
+                <a16:creationId xmlns:a16="http://schemas.microsoft.com/office/drawing/2014/main" id="{7D73191E-F51B-1742-A404-CADEC843D0E7}"/>
+              </a:ext>
+            </a:extLst>
+          </p:cNvPr>
+          <p:cNvSpPr txBox="1"/>
+          <p:nvPr/>
+        </p:nvSpPr>
+        <p:spPr>
+          <a:xfrm>
+            <a:off x="10195560" y="5865891"/>
+            <a:ext cx="987552" cy="307777"/>
+          </a:xfrm>
+          <a:prstGeom prst="rect">
+            <a:avLst/>
+          </a:prstGeom>
+          <a:noFill/>
+        </p:spPr>
+        <p:txBody>
+          <a:bodyPr wrap="square" rtlCol="0">
+            <a:spAutoFit/>
+          </a:bodyPr>
+          <a:lstStyle/>
+          <a:p>
+            <a:r>
+              <a:rPr lang="en-US" sz="1400" b="1" dirty="0"/>
+              <a:t>spicy</a:t>
+            </a:r>
+          </a:p>
+        </p:txBody>
+      </p:sp>
+      <p:sp>
+        <p:nvSpPr>
+          <p:cNvPr id="17" name="TextBox 16">
+            <a:extLst>
+              <a:ext uri="{FF2B5EF4-FFF2-40B4-BE49-F238E27FC236}">
+                <a16:creationId xmlns:a16="http://schemas.microsoft.com/office/drawing/2014/main" id="{5A388314-9AD4-1245-9FB8-A8F1D185978A}"/>
+              </a:ext>
+            </a:extLst>
+          </p:cNvPr>
+          <p:cNvSpPr txBox="1"/>
+          <p:nvPr/>
+        </p:nvSpPr>
+        <p:spPr>
+          <a:xfrm rot="16200000">
+            <a:off x="6065353" y="2537364"/>
+            <a:ext cx="987552" cy="307777"/>
+          </a:xfrm>
+          <a:prstGeom prst="rect">
+            <a:avLst/>
+          </a:prstGeom>
+          <a:noFill/>
+        </p:spPr>
+        <p:txBody>
+          <a:bodyPr wrap="square" rtlCol="0">
+            <a:spAutoFit/>
+          </a:bodyPr>
+          <a:lstStyle/>
+          <a:p>
+            <a:r>
+              <a:rPr lang="en-US" sz="1400" b="1" dirty="0"/>
+              <a:t>savory</a:t>
+            </a:r>
+          </a:p>
+        </p:txBody>
+      </p:sp>
+      <p:pic>
+        <p:nvPicPr>
+          <p:cNvPr id="16" name="Picture 15">
+            <a:extLst>
+              <a:ext uri="{FF2B5EF4-FFF2-40B4-BE49-F238E27FC236}">
+                <a16:creationId xmlns:a16="http://schemas.microsoft.com/office/drawing/2014/main" id="{56DD885D-5EF2-C54A-A984-EE68F286BA97}"/>
+              </a:ext>
+            </a:extLst>
+          </p:cNvPr>
+          <p:cNvPicPr>
+            <a:picLocks noChangeAspect="1"/>
+          </p:cNvPicPr>
+          <p:nvPr/>
+        </p:nvPicPr>
+        <p:blipFill>
+          <a:blip r:embed="rId3"/>
+          <a:stretch>
+            <a:fillRect/>
+          </a:stretch>
+        </p:blipFill>
+        <p:spPr>
+          <a:xfrm>
+            <a:off x="7172549" y="2378897"/>
+            <a:ext cx="936325" cy="624709"/>
+          </a:xfrm>
+          <a:prstGeom prst="rect">
+            <a:avLst/>
+          </a:prstGeom>
+        </p:spPr>
+      </p:pic>
+      <p:pic>
+        <p:nvPicPr>
+          <p:cNvPr id="23" name="Picture 22">
+            <a:extLst>
+              <a:ext uri="{FF2B5EF4-FFF2-40B4-BE49-F238E27FC236}">
+                <a16:creationId xmlns:a16="http://schemas.microsoft.com/office/drawing/2014/main" id="{A8E3C242-091D-994C-BCEC-B7D5C51C76D2}"/>
+              </a:ext>
+            </a:extLst>
+          </p:cNvPr>
+          <p:cNvPicPr>
+            <a:picLocks noChangeAspect="1"/>
+          </p:cNvPicPr>
+          <p:nvPr/>
+        </p:nvPicPr>
+        <p:blipFill>
+          <a:blip r:embed="rId4"/>
+          <a:stretch>
+            <a:fillRect/>
+          </a:stretch>
+        </p:blipFill>
+        <p:spPr>
+          <a:xfrm>
+            <a:off x="10376566" y="2325783"/>
+            <a:ext cx="806546" cy="806546"/>
+          </a:xfrm>
+          <a:prstGeom prst="rect">
+            <a:avLst/>
+          </a:prstGeom>
+        </p:spPr>
+      </p:pic>
+      <p:pic>
+        <p:nvPicPr>
+          <p:cNvPr id="27" name="Picture 26">
+            <a:extLst>
+              <a:ext uri="{FF2B5EF4-FFF2-40B4-BE49-F238E27FC236}">
+                <a16:creationId xmlns:a16="http://schemas.microsoft.com/office/drawing/2014/main" id="{BCEC01B1-6BAE-054C-80CE-50E9692C19C5}"/>
+              </a:ext>
+            </a:extLst>
+          </p:cNvPr>
+          <p:cNvPicPr>
+            <a:picLocks noChangeAspect="1"/>
+          </p:cNvPicPr>
+          <p:nvPr/>
+        </p:nvPicPr>
+        <p:blipFill>
+          <a:blip r:embed="rId5"/>
+          <a:stretch>
+            <a:fillRect/>
+          </a:stretch>
+        </p:blipFill>
+        <p:spPr>
+          <a:xfrm>
+            <a:off x="8723377" y="3072262"/>
+            <a:ext cx="1049626" cy="667785"/>
+          </a:xfrm>
+          <a:prstGeom prst="rect">
+            <a:avLst/>
+          </a:prstGeom>
+        </p:spPr>
+      </p:pic>
+      <p:pic>
+        <p:nvPicPr>
+          <p:cNvPr id="29" name="Picture 28">
+            <a:extLst>
+              <a:ext uri="{FF2B5EF4-FFF2-40B4-BE49-F238E27FC236}">
+                <a16:creationId xmlns:a16="http://schemas.microsoft.com/office/drawing/2014/main" id="{190F2293-EC84-BA47-9A9E-EE4B42141BCA}"/>
+              </a:ext>
+            </a:extLst>
+          </p:cNvPr>
+          <p:cNvPicPr>
+            <a:picLocks noChangeAspect="1"/>
+          </p:cNvPicPr>
+          <p:nvPr/>
+        </p:nvPicPr>
+        <p:blipFill>
+          <a:blip r:embed="rId6"/>
+          <a:stretch>
+            <a:fillRect/>
+          </a:stretch>
+        </p:blipFill>
+        <p:spPr>
+          <a:xfrm>
+            <a:off x="7068579" y="4956395"/>
+            <a:ext cx="1027459" cy="688397"/>
+          </a:xfrm>
+          <a:prstGeom prst="rect">
+            <a:avLst/>
+          </a:prstGeom>
+        </p:spPr>
+      </p:pic>
+      <p:sp>
+        <p:nvSpPr>
+          <p:cNvPr id="30" name="TextBox 29">
+            <a:extLst>
+              <a:ext uri="{FF2B5EF4-FFF2-40B4-BE49-F238E27FC236}">
+                <a16:creationId xmlns:a16="http://schemas.microsoft.com/office/drawing/2014/main" id="{D06E0FCE-DE98-1745-B9EB-ED44402F3749}"/>
+              </a:ext>
+            </a:extLst>
+          </p:cNvPr>
+          <p:cNvSpPr txBox="1"/>
+          <p:nvPr/>
+        </p:nvSpPr>
+        <p:spPr>
+          <a:xfrm>
+            <a:off x="7176482" y="2126707"/>
+            <a:ext cx="928459" cy="246221"/>
+          </a:xfrm>
+          <a:prstGeom prst="rect">
+            <a:avLst/>
+          </a:prstGeom>
+          <a:noFill/>
+        </p:spPr>
+        <p:txBody>
+          <a:bodyPr wrap="none" rtlCol="0">
+            <a:spAutoFit/>
+          </a:bodyPr>
+          <a:lstStyle/>
+          <a:p>
+            <a:r>
+              <a:rPr lang="en-US" sz="1000" b="1" dirty="0"/>
+              <a:t>Fish and chips</a:t>
+            </a:r>
+          </a:p>
+        </p:txBody>
+      </p:sp>
+      <p:sp>
+        <p:nvSpPr>
+          <p:cNvPr id="31" name="TextBox 30">
+            <a:extLst>
+              <a:ext uri="{FF2B5EF4-FFF2-40B4-BE49-F238E27FC236}">
+                <a16:creationId xmlns:a16="http://schemas.microsoft.com/office/drawing/2014/main" id="{E9A1D29D-65BE-B940-B925-02E1673994D2}"/>
+              </a:ext>
+            </a:extLst>
+          </p:cNvPr>
+          <p:cNvSpPr txBox="1"/>
+          <p:nvPr/>
+        </p:nvSpPr>
+        <p:spPr>
+          <a:xfrm>
+            <a:off x="9015594" y="2808389"/>
+            <a:ext cx="484428" cy="246221"/>
+          </a:xfrm>
+          <a:prstGeom prst="rect">
+            <a:avLst/>
+          </a:prstGeom>
+          <a:noFill/>
+        </p:spPr>
+        <p:txBody>
+          <a:bodyPr wrap="none" rtlCol="0">
+            <a:spAutoFit/>
+          </a:bodyPr>
+          <a:lstStyle/>
+          <a:p>
+            <a:r>
+              <a:rPr lang="en-US" sz="1000" b="1" dirty="0"/>
+              <a:t>Tacos</a:t>
+            </a:r>
+          </a:p>
+        </p:txBody>
+      </p:sp>
+      <p:sp>
+        <p:nvSpPr>
+          <p:cNvPr id="33" name="TextBox 32">
+            <a:extLst>
+              <a:ext uri="{FF2B5EF4-FFF2-40B4-BE49-F238E27FC236}">
+                <a16:creationId xmlns:a16="http://schemas.microsoft.com/office/drawing/2014/main" id="{13411283-D47A-1E40-92D6-57765696423E}"/>
+              </a:ext>
+            </a:extLst>
+          </p:cNvPr>
+          <p:cNvSpPr txBox="1"/>
+          <p:nvPr/>
+        </p:nvSpPr>
+        <p:spPr>
+          <a:xfrm>
+            <a:off x="10376566" y="1925673"/>
+            <a:ext cx="1067994" cy="400110"/>
+          </a:xfrm>
+          <a:prstGeom prst="rect">
+            <a:avLst/>
+          </a:prstGeom>
+          <a:noFill/>
+        </p:spPr>
+        <p:txBody>
+          <a:bodyPr wrap="square" rtlCol="0">
+            <a:spAutoFit/>
+          </a:bodyPr>
+          <a:lstStyle/>
+          <a:p>
+            <a:r>
+              <a:rPr lang="en-US" sz="1000" b="1" dirty="0"/>
+              <a:t>Spicy chicken curry</a:t>
+            </a:r>
+          </a:p>
+        </p:txBody>
+      </p:sp>
+      <p:sp>
+        <p:nvSpPr>
+          <p:cNvPr id="34" name="TextBox 33">
+            <a:extLst>
+              <a:ext uri="{FF2B5EF4-FFF2-40B4-BE49-F238E27FC236}">
+                <a16:creationId xmlns:a16="http://schemas.microsoft.com/office/drawing/2014/main" id="{850871A7-5510-064B-9756-8EBC9D48526D}"/>
+              </a:ext>
+            </a:extLst>
+          </p:cNvPr>
+          <p:cNvSpPr txBox="1"/>
+          <p:nvPr/>
+        </p:nvSpPr>
+        <p:spPr>
+          <a:xfrm>
+            <a:off x="7147734" y="4730506"/>
+            <a:ext cx="869149" cy="246221"/>
+          </a:xfrm>
+          <a:prstGeom prst="rect">
+            <a:avLst/>
+          </a:prstGeom>
+          <a:noFill/>
+        </p:spPr>
+        <p:txBody>
+          <a:bodyPr wrap="none" rtlCol="0">
+            <a:spAutoFit/>
+          </a:bodyPr>
+          <a:lstStyle/>
+          <a:p>
+            <a:r>
+              <a:rPr lang="en-US" sz="1000" b="1" dirty="0"/>
+              <a:t>Crème </a:t>
+            </a:r>
+            <a:r>
+              <a:rPr lang="en-US" sz="1000" b="1" dirty="0" err="1"/>
+              <a:t>brulle</a:t>
+            </a:r>
+            <a:endParaRPr lang="en-US" sz="1000" b="1" dirty="0"/>
           </a:p>
         </p:txBody>
       </p:sp>
@@ -7561,6 +7922,458 @@
   <p:clrMapOvr>
     <a:masterClrMapping/>
   </p:clrMapOvr>
+  <p:timing>
+    <p:tnLst>
+      <p:par>
+        <p:cTn id="1" dur="indefinite" restart="never" nodeType="tmRoot">
+          <p:childTnLst>
+            <p:seq concurrent="1" nextAc="seek">
+              <p:cTn id="2" dur="indefinite" nodeType="mainSeq">
+                <p:childTnLst>
+                  <p:par>
+                    <p:cTn id="3" fill="hold">
+                      <p:stCondLst>
+                        <p:cond delay="indefinite"/>
+                      </p:stCondLst>
+                      <p:childTnLst>
+                        <p:par>
+                          <p:cTn id="4" fill="hold">
+                            <p:stCondLst>
+                              <p:cond delay="0"/>
+                            </p:stCondLst>
+                            <p:childTnLst>
+                              <p:par>
+                                <p:cTn id="5" presetID="1" presetClass="entr" presetSubtype="0" fill="hold" grpId="0" nodeType="clickEffect">
+                                  <p:stCondLst>
+                                    <p:cond delay="0"/>
+                                  </p:stCondLst>
+                                  <p:childTnLst>
+                                    <p:set>
+                                      <p:cBhvr>
+                                        <p:cTn id="6" dur="1" fill="hold">
+                                          <p:stCondLst>
+                                            <p:cond delay="0"/>
+                                          </p:stCondLst>
+                                        </p:cTn>
+                                        <p:tgtEl>
+                                          <p:spTgt spid="17"/>
+                                        </p:tgtEl>
+                                        <p:attrNameLst>
+                                          <p:attrName>style.visibility</p:attrName>
+                                        </p:attrNameLst>
+                                      </p:cBhvr>
+                                      <p:to>
+                                        <p:strVal val="visible"/>
+                                      </p:to>
+                                    </p:set>
+                                  </p:childTnLst>
+                                </p:cTn>
+                              </p:par>
+                              <p:par>
+                                <p:cTn id="7" presetID="1" presetClass="entr" presetSubtype="0" fill="hold" nodeType="withEffect">
+                                  <p:stCondLst>
+                                    <p:cond delay="0"/>
+                                  </p:stCondLst>
+                                  <p:childTnLst>
+                                    <p:set>
+                                      <p:cBhvr>
+                                        <p:cTn id="8" dur="1" fill="hold">
+                                          <p:stCondLst>
+                                            <p:cond delay="0"/>
+                                          </p:stCondLst>
+                                        </p:cTn>
+                                        <p:tgtEl>
+                                          <p:spTgt spid="6"/>
+                                        </p:tgtEl>
+                                        <p:attrNameLst>
+                                          <p:attrName>style.visibility</p:attrName>
+                                        </p:attrNameLst>
+                                      </p:cBhvr>
+                                      <p:to>
+                                        <p:strVal val="visible"/>
+                                      </p:to>
+                                    </p:set>
+                                  </p:childTnLst>
+                                </p:cTn>
+                              </p:par>
+                              <p:par>
+                                <p:cTn id="9" presetID="1" presetClass="entr" presetSubtype="0" fill="hold" nodeType="withEffect">
+                                  <p:stCondLst>
+                                    <p:cond delay="0"/>
+                                  </p:stCondLst>
+                                  <p:childTnLst>
+                                    <p:set>
+                                      <p:cBhvr>
+                                        <p:cTn id="10" dur="1" fill="hold">
+                                          <p:stCondLst>
+                                            <p:cond delay="0"/>
+                                          </p:stCondLst>
+                                        </p:cTn>
+                                        <p:tgtEl>
+                                          <p:spTgt spid="9"/>
+                                        </p:tgtEl>
+                                        <p:attrNameLst>
+                                          <p:attrName>style.visibility</p:attrName>
+                                        </p:attrNameLst>
+                                      </p:cBhvr>
+                                      <p:to>
+                                        <p:strVal val="visible"/>
+                                      </p:to>
+                                    </p:set>
+                                  </p:childTnLst>
+                                </p:cTn>
+                              </p:par>
+                              <p:par>
+                                <p:cTn id="11" presetID="1" presetClass="entr" presetSubtype="0" fill="hold" grpId="0" nodeType="withEffect">
+                                  <p:stCondLst>
+                                    <p:cond delay="0"/>
+                                  </p:stCondLst>
+                                  <p:childTnLst>
+                                    <p:set>
+                                      <p:cBhvr>
+                                        <p:cTn id="12" dur="1" fill="hold">
+                                          <p:stCondLst>
+                                            <p:cond delay="0"/>
+                                          </p:stCondLst>
+                                        </p:cTn>
+                                        <p:tgtEl>
+                                          <p:spTgt spid="14"/>
+                                        </p:tgtEl>
+                                        <p:attrNameLst>
+                                          <p:attrName>style.visibility</p:attrName>
+                                        </p:attrNameLst>
+                                      </p:cBhvr>
+                                      <p:to>
+                                        <p:strVal val="visible"/>
+                                      </p:to>
+                                    </p:set>
+                                  </p:childTnLst>
+                                </p:cTn>
+                              </p:par>
+                            </p:childTnLst>
+                          </p:cTn>
+                        </p:par>
+                      </p:childTnLst>
+                    </p:cTn>
+                  </p:par>
+                  <p:par>
+                    <p:cTn id="13" fill="hold">
+                      <p:stCondLst>
+                        <p:cond delay="indefinite"/>
+                      </p:stCondLst>
+                      <p:childTnLst>
+                        <p:par>
+                          <p:cTn id="14" fill="hold">
+                            <p:stCondLst>
+                              <p:cond delay="0"/>
+                            </p:stCondLst>
+                            <p:childTnLst>
+                              <p:par>
+                                <p:cTn id="15" presetID="1" presetClass="entr" presetSubtype="0" fill="hold" nodeType="clickEffect">
+                                  <p:stCondLst>
+                                    <p:cond delay="0"/>
+                                  </p:stCondLst>
+                                  <p:childTnLst>
+                                    <p:set>
+                                      <p:cBhvr>
+                                        <p:cTn id="16" dur="1" fill="hold">
+                                          <p:stCondLst>
+                                            <p:cond delay="0"/>
+                                          </p:stCondLst>
+                                        </p:cTn>
+                                        <p:tgtEl>
+                                          <p:spTgt spid="16"/>
+                                        </p:tgtEl>
+                                        <p:attrNameLst>
+                                          <p:attrName>style.visibility</p:attrName>
+                                        </p:attrNameLst>
+                                      </p:cBhvr>
+                                      <p:to>
+                                        <p:strVal val="visible"/>
+                                      </p:to>
+                                    </p:set>
+                                  </p:childTnLst>
+                                </p:cTn>
+                              </p:par>
+                              <p:par>
+                                <p:cTn id="17" presetID="1" presetClass="entr" presetSubtype="0" fill="hold" grpId="0" nodeType="withEffect">
+                                  <p:stCondLst>
+                                    <p:cond delay="0"/>
+                                  </p:stCondLst>
+                                  <p:childTnLst>
+                                    <p:set>
+                                      <p:cBhvr>
+                                        <p:cTn id="18" dur="1" fill="hold">
+                                          <p:stCondLst>
+                                            <p:cond delay="0"/>
+                                          </p:stCondLst>
+                                        </p:cTn>
+                                        <p:tgtEl>
+                                          <p:spTgt spid="30"/>
+                                        </p:tgtEl>
+                                        <p:attrNameLst>
+                                          <p:attrName>style.visibility</p:attrName>
+                                        </p:attrNameLst>
+                                      </p:cBhvr>
+                                      <p:to>
+                                        <p:strVal val="visible"/>
+                                      </p:to>
+                                    </p:set>
+                                  </p:childTnLst>
+                                </p:cTn>
+                              </p:par>
+                            </p:childTnLst>
+                          </p:cTn>
+                        </p:par>
+                      </p:childTnLst>
+                    </p:cTn>
+                  </p:par>
+                  <p:par>
+                    <p:cTn id="19" fill="hold">
+                      <p:stCondLst>
+                        <p:cond delay="indefinite"/>
+                      </p:stCondLst>
+                      <p:childTnLst>
+                        <p:par>
+                          <p:cTn id="20" fill="hold">
+                            <p:stCondLst>
+                              <p:cond delay="0"/>
+                            </p:stCondLst>
+                            <p:childTnLst>
+                              <p:par>
+                                <p:cTn id="21" presetID="1" presetClass="entr" presetSubtype="0" fill="hold" nodeType="clickEffect">
+                                  <p:stCondLst>
+                                    <p:cond delay="0"/>
+                                  </p:stCondLst>
+                                  <p:childTnLst>
+                                    <p:set>
+                                      <p:cBhvr>
+                                        <p:cTn id="22" dur="1" fill="hold">
+                                          <p:stCondLst>
+                                            <p:cond delay="0"/>
+                                          </p:stCondLst>
+                                        </p:cTn>
+                                        <p:tgtEl>
+                                          <p:spTgt spid="23"/>
+                                        </p:tgtEl>
+                                        <p:attrNameLst>
+                                          <p:attrName>style.visibility</p:attrName>
+                                        </p:attrNameLst>
+                                      </p:cBhvr>
+                                      <p:to>
+                                        <p:strVal val="visible"/>
+                                      </p:to>
+                                    </p:set>
+                                  </p:childTnLst>
+                                </p:cTn>
+                              </p:par>
+                              <p:par>
+                                <p:cTn id="23" presetID="1" presetClass="entr" presetSubtype="0" fill="hold" grpId="0" nodeType="withEffect">
+                                  <p:stCondLst>
+                                    <p:cond delay="0"/>
+                                  </p:stCondLst>
+                                  <p:childTnLst>
+                                    <p:set>
+                                      <p:cBhvr>
+                                        <p:cTn id="24" dur="1" fill="hold">
+                                          <p:stCondLst>
+                                            <p:cond delay="0"/>
+                                          </p:stCondLst>
+                                        </p:cTn>
+                                        <p:tgtEl>
+                                          <p:spTgt spid="33"/>
+                                        </p:tgtEl>
+                                        <p:attrNameLst>
+                                          <p:attrName>style.visibility</p:attrName>
+                                        </p:attrNameLst>
+                                      </p:cBhvr>
+                                      <p:to>
+                                        <p:strVal val="visible"/>
+                                      </p:to>
+                                    </p:set>
+                                  </p:childTnLst>
+                                </p:cTn>
+                              </p:par>
+                            </p:childTnLst>
+                          </p:cTn>
+                        </p:par>
+                      </p:childTnLst>
+                    </p:cTn>
+                  </p:par>
+                  <p:par>
+                    <p:cTn id="25" fill="hold">
+                      <p:stCondLst>
+                        <p:cond delay="indefinite"/>
+                      </p:stCondLst>
+                      <p:childTnLst>
+                        <p:par>
+                          <p:cTn id="26" fill="hold">
+                            <p:stCondLst>
+                              <p:cond delay="0"/>
+                            </p:stCondLst>
+                            <p:childTnLst>
+                              <p:par>
+                                <p:cTn id="27" presetID="1" presetClass="entr" presetSubtype="0" fill="hold" nodeType="clickEffect">
+                                  <p:stCondLst>
+                                    <p:cond delay="0"/>
+                                  </p:stCondLst>
+                                  <p:childTnLst>
+                                    <p:set>
+                                      <p:cBhvr>
+                                        <p:cTn id="28" dur="1" fill="hold">
+                                          <p:stCondLst>
+                                            <p:cond delay="0"/>
+                                          </p:stCondLst>
+                                        </p:cTn>
+                                        <p:tgtEl>
+                                          <p:spTgt spid="27"/>
+                                        </p:tgtEl>
+                                        <p:attrNameLst>
+                                          <p:attrName>style.visibility</p:attrName>
+                                        </p:attrNameLst>
+                                      </p:cBhvr>
+                                      <p:to>
+                                        <p:strVal val="visible"/>
+                                      </p:to>
+                                    </p:set>
+                                  </p:childTnLst>
+                                </p:cTn>
+                              </p:par>
+                              <p:par>
+                                <p:cTn id="29" presetID="1" presetClass="entr" presetSubtype="0" fill="hold" grpId="0" nodeType="withEffect">
+                                  <p:stCondLst>
+                                    <p:cond delay="0"/>
+                                  </p:stCondLst>
+                                  <p:childTnLst>
+                                    <p:set>
+                                      <p:cBhvr>
+                                        <p:cTn id="30" dur="1" fill="hold">
+                                          <p:stCondLst>
+                                            <p:cond delay="0"/>
+                                          </p:stCondLst>
+                                        </p:cTn>
+                                        <p:tgtEl>
+                                          <p:spTgt spid="31"/>
+                                        </p:tgtEl>
+                                        <p:attrNameLst>
+                                          <p:attrName>style.visibility</p:attrName>
+                                        </p:attrNameLst>
+                                      </p:cBhvr>
+                                      <p:to>
+                                        <p:strVal val="visible"/>
+                                      </p:to>
+                                    </p:set>
+                                  </p:childTnLst>
+                                </p:cTn>
+                              </p:par>
+                            </p:childTnLst>
+                          </p:cTn>
+                        </p:par>
+                      </p:childTnLst>
+                    </p:cTn>
+                  </p:par>
+                  <p:par>
+                    <p:cTn id="31" fill="hold">
+                      <p:stCondLst>
+                        <p:cond delay="indefinite"/>
+                      </p:stCondLst>
+                      <p:childTnLst>
+                        <p:par>
+                          <p:cTn id="32" fill="hold">
+                            <p:stCondLst>
+                              <p:cond delay="0"/>
+                            </p:stCondLst>
+                            <p:childTnLst>
+                              <p:par>
+                                <p:cTn id="33" presetID="1" presetClass="entr" presetSubtype="0" fill="hold" nodeType="clickEffect">
+                                  <p:stCondLst>
+                                    <p:cond delay="0"/>
+                                  </p:stCondLst>
+                                  <p:childTnLst>
+                                    <p:set>
+                                      <p:cBhvr>
+                                        <p:cTn id="34" dur="1" fill="hold">
+                                          <p:stCondLst>
+                                            <p:cond delay="0"/>
+                                          </p:stCondLst>
+                                        </p:cTn>
+                                        <p:tgtEl>
+                                          <p:spTgt spid="29"/>
+                                        </p:tgtEl>
+                                        <p:attrNameLst>
+                                          <p:attrName>style.visibility</p:attrName>
+                                        </p:attrNameLst>
+                                      </p:cBhvr>
+                                      <p:to>
+                                        <p:strVal val="visible"/>
+                                      </p:to>
+                                    </p:set>
+                                  </p:childTnLst>
+                                </p:cTn>
+                              </p:par>
+                              <p:par>
+                                <p:cTn id="35" presetID="1" presetClass="entr" presetSubtype="0" fill="hold" grpId="0" nodeType="withEffect">
+                                  <p:stCondLst>
+                                    <p:cond delay="0"/>
+                                  </p:stCondLst>
+                                  <p:childTnLst>
+                                    <p:set>
+                                      <p:cBhvr>
+                                        <p:cTn id="36" dur="1" fill="hold">
+                                          <p:stCondLst>
+                                            <p:cond delay="0"/>
+                                          </p:stCondLst>
+                                        </p:cTn>
+                                        <p:tgtEl>
+                                          <p:spTgt spid="34"/>
+                                        </p:tgtEl>
+                                        <p:attrNameLst>
+                                          <p:attrName>style.visibility</p:attrName>
+                                        </p:attrNameLst>
+                                      </p:cBhvr>
+                                      <p:to>
+                                        <p:strVal val="visible"/>
+                                      </p:to>
+                                    </p:set>
+                                  </p:childTnLst>
+                                </p:cTn>
+                              </p:par>
+                            </p:childTnLst>
+                          </p:cTn>
+                        </p:par>
+                      </p:childTnLst>
+                    </p:cTn>
+                  </p:par>
+                </p:childTnLst>
+              </p:cTn>
+              <p:prevCondLst>
+                <p:cond evt="onPrev" delay="0">
+                  <p:tgtEl>
+                    <p:sldTgt/>
+                  </p:tgtEl>
+                </p:cond>
+              </p:prevCondLst>
+              <p:nextCondLst>
+                <p:cond evt="onNext" delay="0">
+                  <p:tgtEl>
+                    <p:sldTgt/>
+                  </p:tgtEl>
+                </p:cond>
+              </p:nextCondLst>
+            </p:seq>
+          </p:childTnLst>
+        </p:cTn>
+      </p:par>
+    </p:tnLst>
+    <p:bldLst>
+      <p:bldP spid="14" grpId="0"/>
+      <p:bldP spid="17" grpId="0"/>
+      <p:bldP spid="30" grpId="0"/>
+      <p:bldP spid="31" grpId="0"/>
+      <p:bldP spid="33" grpId="0"/>
+      <p:bldP spid="34" grpId="0"/>
+    </p:bldLst>
+  </p:timing>
 </p:sld>
 </file>
 

</xml_diff>